<commit_message>
column name changed: fate-->type
</commit_message>
<xml_diff>
--- a/Procedures_coding_hazelnut_architecture.pptx
+++ b/Procedures_coding_hazelnut_architecture.pptx
@@ -13,6 +13,7 @@
     <p:sldId id="263" r:id="rId7"/>
     <p:sldId id="266" r:id="rId8"/>
     <p:sldId id="265" r:id="rId9"/>
+    <p:sldId id="267" r:id="rId10"/>
   </p:sldIdLst>
   <p:sldSz cx="9144000" cy="6858000" type="screen4x3"/>
   <p:notesSz cx="9144000" cy="6858000"/>
@@ -111,6 +112,11 @@
       </a:defRPr>
     </a:lvl9pPr>
   </p:defaultTextStyle>
+  <p:extLst>
+    <p:ext uri="{EFAFB233-063F-42B5-8137-9DF3F51BA10A}">
+      <p15:sldGuideLst xmlns:p15="http://schemas.microsoft.com/office/powerpoint/2012/main"/>
+    </p:ext>
+  </p:extLst>
 </p:presentation>
 </file>
 
@@ -245,7 +251,7 @@
           <a:p>
             <a:fld id="{B4170786-3030-4160-9468-62B9527C914D}" type="datetimeFigureOut">
               <a:rPr lang="it-IT" smtClean="0"/>
-              <a:t>26/01/2022</a:t>
+              <a:t>28/01/2022</a:t>
             </a:fld>
             <a:endParaRPr lang="it-IT"/>
           </a:p>
@@ -415,7 +421,7 @@
           <a:p>
             <a:fld id="{B4170786-3030-4160-9468-62B9527C914D}" type="datetimeFigureOut">
               <a:rPr lang="it-IT" smtClean="0"/>
-              <a:t>26/01/2022</a:t>
+              <a:t>28/01/2022</a:t>
             </a:fld>
             <a:endParaRPr lang="it-IT"/>
           </a:p>
@@ -595,7 +601,7 @@
           <a:p>
             <a:fld id="{B4170786-3030-4160-9468-62B9527C914D}" type="datetimeFigureOut">
               <a:rPr lang="it-IT" smtClean="0"/>
-              <a:t>26/01/2022</a:t>
+              <a:t>28/01/2022</a:t>
             </a:fld>
             <a:endParaRPr lang="it-IT"/>
           </a:p>
@@ -765,7 +771,7 @@
           <a:p>
             <a:fld id="{B4170786-3030-4160-9468-62B9527C914D}" type="datetimeFigureOut">
               <a:rPr lang="it-IT" smtClean="0"/>
-              <a:t>26/01/2022</a:t>
+              <a:t>28/01/2022</a:t>
             </a:fld>
             <a:endParaRPr lang="it-IT"/>
           </a:p>
@@ -1009,7 +1015,7 @@
           <a:p>
             <a:fld id="{B4170786-3030-4160-9468-62B9527C914D}" type="datetimeFigureOut">
               <a:rPr lang="it-IT" smtClean="0"/>
-              <a:t>26/01/2022</a:t>
+              <a:t>28/01/2022</a:t>
             </a:fld>
             <a:endParaRPr lang="it-IT"/>
           </a:p>
@@ -1241,7 +1247,7 @@
           <a:p>
             <a:fld id="{B4170786-3030-4160-9468-62B9527C914D}" type="datetimeFigureOut">
               <a:rPr lang="it-IT" smtClean="0"/>
-              <a:t>26/01/2022</a:t>
+              <a:t>28/01/2022</a:t>
             </a:fld>
             <a:endParaRPr lang="it-IT"/>
           </a:p>
@@ -1608,7 +1614,7 @@
           <a:p>
             <a:fld id="{B4170786-3030-4160-9468-62B9527C914D}" type="datetimeFigureOut">
               <a:rPr lang="it-IT" smtClean="0"/>
-              <a:t>26/01/2022</a:t>
+              <a:t>28/01/2022</a:t>
             </a:fld>
             <a:endParaRPr lang="it-IT"/>
           </a:p>
@@ -1726,7 +1732,7 @@
           <a:p>
             <a:fld id="{B4170786-3030-4160-9468-62B9527C914D}" type="datetimeFigureOut">
               <a:rPr lang="it-IT" smtClean="0"/>
-              <a:t>26/01/2022</a:t>
+              <a:t>28/01/2022</a:t>
             </a:fld>
             <a:endParaRPr lang="it-IT"/>
           </a:p>
@@ -1821,7 +1827,7 @@
           <a:p>
             <a:fld id="{B4170786-3030-4160-9468-62B9527C914D}" type="datetimeFigureOut">
               <a:rPr lang="it-IT" smtClean="0"/>
-              <a:t>26/01/2022</a:t>
+              <a:t>28/01/2022</a:t>
             </a:fld>
             <a:endParaRPr lang="it-IT"/>
           </a:p>
@@ -2098,7 +2104,7 @@
           <a:p>
             <a:fld id="{B4170786-3030-4160-9468-62B9527C914D}" type="datetimeFigureOut">
               <a:rPr lang="it-IT" smtClean="0"/>
-              <a:t>26/01/2022</a:t>
+              <a:t>28/01/2022</a:t>
             </a:fld>
             <a:endParaRPr lang="it-IT"/>
           </a:p>
@@ -2355,7 +2361,7 @@
           <a:p>
             <a:fld id="{B4170786-3030-4160-9468-62B9527C914D}" type="datetimeFigureOut">
               <a:rPr lang="it-IT" smtClean="0"/>
-              <a:t>26/01/2022</a:t>
+              <a:t>28/01/2022</a:t>
             </a:fld>
             <a:endParaRPr lang="it-IT"/>
           </a:p>
@@ -2568,7 +2574,7 @@
           <a:p>
             <a:fld id="{B4170786-3030-4160-9468-62B9527C914D}" type="datetimeFigureOut">
               <a:rPr lang="it-IT" smtClean="0"/>
-              <a:t>26/01/2022</a:t>
+              <a:t>28/01/2022</a:t>
             </a:fld>
             <a:endParaRPr lang="it-IT"/>
           </a:p>
@@ -7992,14 +7998,6 @@
             </a:r>
             <a:r>
               <a:rPr lang="it-IT" sz="1200" dirty="0" err="1"/>
-              <a:t>eac</a:t>
-            </a:r>
-            <a:r>
-              <a:rPr lang="it-IT" sz="1200" dirty="0"/>
-              <a:t> </a:t>
-            </a:r>
-            <a:r>
-              <a:rPr lang="it-IT" sz="1200" dirty="0" err="1"/>
               <a:t>type</a:t>
             </a:r>
             <a:r>
@@ -8089,8 +8087,8 @@
         </p:blipFill>
         <p:spPr>
           <a:xfrm>
-            <a:off x="1038031" y="2450130"/>
-            <a:ext cx="6415470" cy="2945180"/>
+            <a:off x="633223" y="2485506"/>
+            <a:ext cx="7877554" cy="3616386"/>
           </a:xfrm>
           <a:prstGeom prst="rect">
             <a:avLst/>
@@ -9787,6 +9785,1067 @@
     <p:extLst>
       <p:ext uri="{BB962C8B-B14F-4D97-AF65-F5344CB8AC3E}">
         <p14:creationId xmlns:p14="http://schemas.microsoft.com/office/powerpoint/2010/main" val="476524097"/>
+      </p:ext>
+    </p:extLst>
+  </p:cSld>
+  <p:clrMapOvr>
+    <a:masterClrMapping/>
+  </p:clrMapOvr>
+</p:sld>
+</file>
+
+<file path=ppt/slides/slide9.xml><?xml version="1.0" encoding="utf-8"?>
+<p:sld xmlns:a="http://schemas.openxmlformats.org/drawingml/2006/main" xmlns:r="http://schemas.openxmlformats.org/officeDocument/2006/relationships" xmlns:p="http://schemas.openxmlformats.org/presentationml/2006/main">
+  <p:cSld>
+    <p:spTree>
+      <p:nvGrpSpPr>
+        <p:cNvPr id="1" name=""/>
+        <p:cNvGrpSpPr/>
+        <p:nvPr/>
+      </p:nvGrpSpPr>
+      <p:grpSpPr>
+        <a:xfrm>
+          <a:off x="0" y="0"/>
+          <a:ext cx="0" cy="0"/>
+          <a:chOff x="0" y="0"/>
+          <a:chExt cx="0" cy="0"/>
+        </a:xfrm>
+      </p:grpSpPr>
+      <p:pic>
+        <p:nvPicPr>
+          <p:cNvPr id="2" name="Picture 1">
+            <a:extLst>
+              <a:ext uri="{FF2B5EF4-FFF2-40B4-BE49-F238E27FC236}">
+                <a16:creationId xmlns:a16="http://schemas.microsoft.com/office/drawing/2014/main" id="{4A763A12-2603-4235-ADD9-39D5480AB56C}"/>
+              </a:ext>
+            </a:extLst>
+          </p:cNvPr>
+          <p:cNvPicPr>
+            <a:picLocks noChangeAspect="1"/>
+          </p:cNvPicPr>
+          <p:nvPr/>
+        </p:nvPicPr>
+        <p:blipFill>
+          <a:blip r:embed="rId2"/>
+          <a:stretch>
+            <a:fillRect/>
+          </a:stretch>
+        </p:blipFill>
+        <p:spPr>
+          <a:xfrm>
+            <a:off x="-61122" y="3338309"/>
+            <a:ext cx="9123318" cy="2488912"/>
+          </a:xfrm>
+          <a:prstGeom prst="rect">
+            <a:avLst/>
+          </a:prstGeom>
+        </p:spPr>
+      </p:pic>
+      <p:sp>
+        <p:nvSpPr>
+          <p:cNvPr id="3" name="Rectangle 2">
+            <a:extLst>
+              <a:ext uri="{FF2B5EF4-FFF2-40B4-BE49-F238E27FC236}">
+                <a16:creationId xmlns:a16="http://schemas.microsoft.com/office/drawing/2014/main" id="{63C99EBE-5FD8-4573-A569-ABDC7E266880}"/>
+              </a:ext>
+            </a:extLst>
+          </p:cNvPr>
+          <p:cNvSpPr/>
+          <p:nvPr/>
+        </p:nvSpPr>
+        <p:spPr>
+          <a:xfrm>
+            <a:off x="3600290" y="0"/>
+            <a:ext cx="1800494" cy="923330"/>
+          </a:xfrm>
+          <a:prstGeom prst="rect">
+            <a:avLst/>
+          </a:prstGeom>
+          <a:noFill/>
+        </p:spPr>
+        <p:txBody>
+          <a:bodyPr wrap="none" lIns="91440" tIns="45720" rIns="91440" bIns="45720">
+            <a:spAutoFit/>
+          </a:bodyPr>
+          <a:lstStyle/>
+          <a:p>
+            <a:pPr algn="ctr"/>
+            <a:r>
+              <a:rPr lang="en-US" sz="5400" b="1" dirty="0">
+                <a:ln w="22225">
+                  <a:solidFill>
+                    <a:schemeClr val="accent2"/>
+                  </a:solidFill>
+                  <a:prstDash val="solid"/>
+                </a:ln>
+                <a:solidFill>
+                  <a:schemeClr val="accent2">
+                    <a:lumMod val="40000"/>
+                    <a:lumOff val="60000"/>
+                  </a:schemeClr>
+                </a:solidFill>
+              </a:rPr>
+              <a:t>GLMs</a:t>
+            </a:r>
+            <a:endParaRPr lang="en-US" sz="5400" b="1" cap="none" spc="0" dirty="0">
+              <a:ln w="22225">
+                <a:solidFill>
+                  <a:schemeClr val="accent2"/>
+                </a:solidFill>
+                <a:prstDash val="solid"/>
+              </a:ln>
+              <a:solidFill>
+                <a:schemeClr val="accent2">
+                  <a:lumMod val="40000"/>
+                  <a:lumOff val="60000"/>
+                </a:schemeClr>
+              </a:solidFill>
+              <a:effectLst/>
+            </a:endParaRPr>
+          </a:p>
+        </p:txBody>
+      </p:sp>
+      <p:sp>
+        <p:nvSpPr>
+          <p:cNvPr id="4" name="TextBox 3">
+            <a:extLst>
+              <a:ext uri="{FF2B5EF4-FFF2-40B4-BE49-F238E27FC236}">
+                <a16:creationId xmlns:a16="http://schemas.microsoft.com/office/drawing/2014/main" id="{A8172D69-505E-49EB-9B42-373027986372}"/>
+              </a:ext>
+            </a:extLst>
+          </p:cNvPr>
+          <p:cNvSpPr txBox="1"/>
+          <p:nvPr/>
+        </p:nvSpPr>
+        <p:spPr>
+          <a:xfrm>
+            <a:off x="6920775" y="1959515"/>
+            <a:ext cx="2451132" cy="923330"/>
+          </a:xfrm>
+          <a:prstGeom prst="rect">
+            <a:avLst/>
+          </a:prstGeom>
+          <a:noFill/>
+        </p:spPr>
+        <p:txBody>
+          <a:bodyPr wrap="square" rtlCol="0">
+            <a:spAutoFit/>
+          </a:bodyPr>
+          <a:lstStyle/>
+          <a:p>
+            <a:r>
+              <a:rPr lang="it-IT" dirty="0"/>
+              <a:t>Two </a:t>
+            </a:r>
+            <a:r>
+              <a:rPr lang="it-IT" dirty="0" err="1"/>
+              <a:t>GLMs</a:t>
+            </a:r>
+            <a:r>
+              <a:rPr lang="it-IT" dirty="0"/>
+              <a:t>:</a:t>
+            </a:r>
+          </a:p>
+          <a:p>
+            <a:pPr marL="342900" indent="-342900">
+              <a:buFont typeface="+mj-lt"/>
+              <a:buAutoNum type="arabicPeriod"/>
+            </a:pPr>
+            <a:r>
+              <a:rPr lang="it-IT" dirty="0"/>
+              <a:t>For fate=V</a:t>
+            </a:r>
+          </a:p>
+          <a:p>
+            <a:pPr marL="342900" indent="-342900">
+              <a:buFont typeface="+mj-lt"/>
+              <a:buAutoNum type="arabicPeriod"/>
+            </a:pPr>
+            <a:r>
+              <a:rPr lang="it-IT" dirty="0"/>
+              <a:t>For fate=M</a:t>
+            </a:r>
+          </a:p>
+        </p:txBody>
+      </p:sp>
+      <p:sp>
+        <p:nvSpPr>
+          <p:cNvPr id="5" name="TextBox 4">
+            <a:extLst>
+              <a:ext uri="{FF2B5EF4-FFF2-40B4-BE49-F238E27FC236}">
+                <a16:creationId xmlns:a16="http://schemas.microsoft.com/office/drawing/2014/main" id="{B2DBC69D-FFCF-4E2D-9DFD-7BC5A0EC66DA}"/>
+              </a:ext>
+            </a:extLst>
+          </p:cNvPr>
+          <p:cNvSpPr txBox="1"/>
+          <p:nvPr/>
+        </p:nvSpPr>
+        <p:spPr>
+          <a:xfrm>
+            <a:off x="3127253" y="846113"/>
+            <a:ext cx="4547062" cy="369332"/>
+          </a:xfrm>
+          <a:prstGeom prst="rect">
+            <a:avLst/>
+          </a:prstGeom>
+          <a:noFill/>
+        </p:spPr>
+        <p:txBody>
+          <a:bodyPr wrap="square" rtlCol="0">
+            <a:spAutoFit/>
+          </a:bodyPr>
+          <a:lstStyle/>
+          <a:p>
+            <a:r>
+              <a:rPr lang="it-IT" dirty="0"/>
+              <a:t>glm(Y~F1+F2+F3+F4+F5+F6+F7)</a:t>
+            </a:r>
+          </a:p>
+        </p:txBody>
+      </p:sp>
+      <p:sp>
+        <p:nvSpPr>
+          <p:cNvPr id="6" name="Rectangle 5">
+            <a:extLst>
+              <a:ext uri="{FF2B5EF4-FFF2-40B4-BE49-F238E27FC236}">
+                <a16:creationId xmlns:a16="http://schemas.microsoft.com/office/drawing/2014/main" id="{150B1C9E-49C6-46DD-92B9-93FC41B69096}"/>
+              </a:ext>
+            </a:extLst>
+          </p:cNvPr>
+          <p:cNvSpPr/>
+          <p:nvPr/>
+        </p:nvSpPr>
+        <p:spPr>
+          <a:xfrm>
+            <a:off x="5954248" y="3021092"/>
+            <a:ext cx="457051" cy="3056237"/>
+          </a:xfrm>
+          <a:prstGeom prst="rect">
+            <a:avLst/>
+          </a:prstGeom>
+          <a:solidFill>
+            <a:schemeClr val="accent6">
+              <a:alpha val="40000"/>
+            </a:schemeClr>
+          </a:solidFill>
+          <a:ln>
+            <a:noFill/>
+          </a:ln>
+        </p:spPr>
+        <p:style>
+          <a:lnRef idx="2">
+            <a:schemeClr val="accent1">
+              <a:shade val="50000"/>
+            </a:schemeClr>
+          </a:lnRef>
+          <a:fillRef idx="1">
+            <a:schemeClr val="accent1"/>
+          </a:fillRef>
+          <a:effectRef idx="0">
+            <a:schemeClr val="accent1"/>
+          </a:effectRef>
+          <a:fontRef idx="minor">
+            <a:schemeClr val="lt1"/>
+          </a:fontRef>
+        </p:style>
+        <p:txBody>
+          <a:bodyPr rtlCol="0" anchor="ctr"/>
+          <a:lstStyle/>
+          <a:p>
+            <a:pPr algn="ctr"/>
+            <a:endParaRPr lang="it-IT" dirty="0"/>
+          </a:p>
+        </p:txBody>
+      </p:sp>
+      <p:sp>
+        <p:nvSpPr>
+          <p:cNvPr id="7" name="TextBox 6">
+            <a:extLst>
+              <a:ext uri="{FF2B5EF4-FFF2-40B4-BE49-F238E27FC236}">
+                <a16:creationId xmlns:a16="http://schemas.microsoft.com/office/drawing/2014/main" id="{461AE0D1-645F-4B9E-B89C-16691F6B3B63}"/>
+              </a:ext>
+            </a:extLst>
+          </p:cNvPr>
+          <p:cNvSpPr txBox="1"/>
+          <p:nvPr/>
+        </p:nvSpPr>
+        <p:spPr>
+          <a:xfrm>
+            <a:off x="6017006" y="2969634"/>
+            <a:ext cx="382386" cy="369332"/>
+          </a:xfrm>
+          <a:prstGeom prst="rect">
+            <a:avLst/>
+          </a:prstGeom>
+          <a:noFill/>
+        </p:spPr>
+        <p:txBody>
+          <a:bodyPr wrap="square" rtlCol="0">
+            <a:spAutoFit/>
+          </a:bodyPr>
+          <a:lstStyle/>
+          <a:p>
+            <a:r>
+              <a:rPr lang="it-IT" dirty="0"/>
+              <a:t>Y</a:t>
+            </a:r>
+          </a:p>
+        </p:txBody>
+      </p:sp>
+      <p:sp>
+        <p:nvSpPr>
+          <p:cNvPr id="12" name="Rectangle 11">
+            <a:extLst>
+              <a:ext uri="{FF2B5EF4-FFF2-40B4-BE49-F238E27FC236}">
+                <a16:creationId xmlns:a16="http://schemas.microsoft.com/office/drawing/2014/main" id="{5E696CFF-FEF4-4F20-BFF3-6B9CF7C88FC0}"/>
+              </a:ext>
+            </a:extLst>
+          </p:cNvPr>
+          <p:cNvSpPr/>
+          <p:nvPr/>
+        </p:nvSpPr>
+        <p:spPr>
+          <a:xfrm>
+            <a:off x="3687749" y="3021090"/>
+            <a:ext cx="457051" cy="3056237"/>
+          </a:xfrm>
+          <a:prstGeom prst="rect">
+            <a:avLst/>
+          </a:prstGeom>
+          <a:solidFill>
+            <a:schemeClr val="accent2">
+              <a:alpha val="40000"/>
+            </a:schemeClr>
+          </a:solidFill>
+          <a:ln>
+            <a:noFill/>
+          </a:ln>
+        </p:spPr>
+        <p:style>
+          <a:lnRef idx="2">
+            <a:schemeClr val="accent1">
+              <a:shade val="50000"/>
+            </a:schemeClr>
+          </a:lnRef>
+          <a:fillRef idx="1">
+            <a:schemeClr val="accent1"/>
+          </a:fillRef>
+          <a:effectRef idx="0">
+            <a:schemeClr val="accent1"/>
+          </a:effectRef>
+          <a:fontRef idx="minor">
+            <a:schemeClr val="lt1"/>
+          </a:fontRef>
+        </p:style>
+        <p:txBody>
+          <a:bodyPr rtlCol="0" anchor="ctr"/>
+          <a:lstStyle/>
+          <a:p>
+            <a:pPr algn="ctr"/>
+            <a:endParaRPr lang="it-IT" dirty="0"/>
+          </a:p>
+        </p:txBody>
+      </p:sp>
+      <p:sp>
+        <p:nvSpPr>
+          <p:cNvPr id="13" name="Rectangle 12">
+            <a:extLst>
+              <a:ext uri="{FF2B5EF4-FFF2-40B4-BE49-F238E27FC236}">
+                <a16:creationId xmlns:a16="http://schemas.microsoft.com/office/drawing/2014/main" id="{F6FE78CC-7B60-4493-B4D0-3EE6891C7D57}"/>
+              </a:ext>
+            </a:extLst>
+          </p:cNvPr>
+          <p:cNvSpPr/>
+          <p:nvPr/>
+        </p:nvSpPr>
+        <p:spPr>
+          <a:xfrm>
+            <a:off x="5054478" y="3021090"/>
+            <a:ext cx="435236" cy="3056237"/>
+          </a:xfrm>
+          <a:prstGeom prst="rect">
+            <a:avLst/>
+          </a:prstGeom>
+          <a:solidFill>
+            <a:schemeClr val="accent2">
+              <a:alpha val="40000"/>
+            </a:schemeClr>
+          </a:solidFill>
+          <a:ln>
+            <a:noFill/>
+          </a:ln>
+        </p:spPr>
+        <p:style>
+          <a:lnRef idx="2">
+            <a:schemeClr val="accent1">
+              <a:shade val="50000"/>
+            </a:schemeClr>
+          </a:lnRef>
+          <a:fillRef idx="1">
+            <a:schemeClr val="accent1"/>
+          </a:fillRef>
+          <a:effectRef idx="0">
+            <a:schemeClr val="accent1"/>
+          </a:effectRef>
+          <a:fontRef idx="minor">
+            <a:schemeClr val="lt1"/>
+          </a:fontRef>
+        </p:style>
+        <p:txBody>
+          <a:bodyPr rtlCol="0" anchor="ctr"/>
+          <a:lstStyle/>
+          <a:p>
+            <a:pPr algn="ctr"/>
+            <a:endParaRPr lang="it-IT" dirty="0"/>
+          </a:p>
+        </p:txBody>
+      </p:sp>
+      <p:sp>
+        <p:nvSpPr>
+          <p:cNvPr id="14" name="Rectangle 13">
+            <a:extLst>
+              <a:ext uri="{FF2B5EF4-FFF2-40B4-BE49-F238E27FC236}">
+                <a16:creationId xmlns:a16="http://schemas.microsoft.com/office/drawing/2014/main" id="{7F728722-9E2C-4838-9B55-2579E84D403D}"/>
+              </a:ext>
+            </a:extLst>
+          </p:cNvPr>
+          <p:cNvSpPr/>
+          <p:nvPr/>
+        </p:nvSpPr>
+        <p:spPr>
+          <a:xfrm>
+            <a:off x="5495691" y="3021091"/>
+            <a:ext cx="452580" cy="3056237"/>
+          </a:xfrm>
+          <a:prstGeom prst="rect">
+            <a:avLst/>
+          </a:prstGeom>
+          <a:solidFill>
+            <a:schemeClr val="accent2">
+              <a:alpha val="40000"/>
+            </a:schemeClr>
+          </a:solidFill>
+          <a:ln>
+            <a:noFill/>
+          </a:ln>
+        </p:spPr>
+        <p:style>
+          <a:lnRef idx="2">
+            <a:schemeClr val="accent1">
+              <a:shade val="50000"/>
+            </a:schemeClr>
+          </a:lnRef>
+          <a:fillRef idx="1">
+            <a:schemeClr val="accent1"/>
+          </a:fillRef>
+          <a:effectRef idx="0">
+            <a:schemeClr val="accent1"/>
+          </a:effectRef>
+          <a:fontRef idx="minor">
+            <a:schemeClr val="lt1"/>
+          </a:fontRef>
+        </p:style>
+        <p:txBody>
+          <a:bodyPr rtlCol="0" anchor="ctr"/>
+          <a:lstStyle/>
+          <a:p>
+            <a:pPr algn="ctr"/>
+            <a:endParaRPr lang="it-IT" dirty="0"/>
+          </a:p>
+        </p:txBody>
+      </p:sp>
+      <p:sp>
+        <p:nvSpPr>
+          <p:cNvPr id="15" name="Rectangle 14">
+            <a:extLst>
+              <a:ext uri="{FF2B5EF4-FFF2-40B4-BE49-F238E27FC236}">
+                <a16:creationId xmlns:a16="http://schemas.microsoft.com/office/drawing/2014/main" id="{BB0D67CB-65E3-4099-8E1C-9ED910E8A84A}"/>
+              </a:ext>
+            </a:extLst>
+          </p:cNvPr>
+          <p:cNvSpPr/>
+          <p:nvPr/>
+        </p:nvSpPr>
+        <p:spPr>
+          <a:xfrm>
+            <a:off x="3221439" y="3021090"/>
+            <a:ext cx="460333" cy="3056237"/>
+          </a:xfrm>
+          <a:prstGeom prst="rect">
+            <a:avLst/>
+          </a:prstGeom>
+          <a:solidFill>
+            <a:schemeClr val="accent2">
+              <a:alpha val="40000"/>
+            </a:schemeClr>
+          </a:solidFill>
+          <a:ln>
+            <a:noFill/>
+          </a:ln>
+        </p:spPr>
+        <p:style>
+          <a:lnRef idx="2">
+            <a:schemeClr val="accent1">
+              <a:shade val="50000"/>
+            </a:schemeClr>
+          </a:lnRef>
+          <a:fillRef idx="1">
+            <a:schemeClr val="accent1"/>
+          </a:fillRef>
+          <a:effectRef idx="0">
+            <a:schemeClr val="accent1"/>
+          </a:effectRef>
+          <a:fontRef idx="minor">
+            <a:schemeClr val="lt1"/>
+          </a:fontRef>
+        </p:style>
+        <p:txBody>
+          <a:bodyPr rtlCol="0" anchor="ctr"/>
+          <a:lstStyle/>
+          <a:p>
+            <a:pPr algn="ctr"/>
+            <a:endParaRPr lang="it-IT" dirty="0"/>
+          </a:p>
+        </p:txBody>
+      </p:sp>
+      <p:sp>
+        <p:nvSpPr>
+          <p:cNvPr id="16" name="Rectangle 15">
+            <a:extLst>
+              <a:ext uri="{FF2B5EF4-FFF2-40B4-BE49-F238E27FC236}">
+                <a16:creationId xmlns:a16="http://schemas.microsoft.com/office/drawing/2014/main" id="{A6D89FCA-20A6-47B0-BA43-90146999C631}"/>
+              </a:ext>
+            </a:extLst>
+          </p:cNvPr>
+          <p:cNvSpPr/>
+          <p:nvPr/>
+        </p:nvSpPr>
+        <p:spPr>
+          <a:xfrm>
+            <a:off x="2778071" y="3021090"/>
+            <a:ext cx="433672" cy="3056237"/>
+          </a:xfrm>
+          <a:prstGeom prst="rect">
+            <a:avLst/>
+          </a:prstGeom>
+          <a:solidFill>
+            <a:schemeClr val="accent2">
+              <a:alpha val="40000"/>
+            </a:schemeClr>
+          </a:solidFill>
+          <a:ln>
+            <a:noFill/>
+          </a:ln>
+        </p:spPr>
+        <p:style>
+          <a:lnRef idx="2">
+            <a:schemeClr val="accent1">
+              <a:shade val="50000"/>
+            </a:schemeClr>
+          </a:lnRef>
+          <a:fillRef idx="1">
+            <a:schemeClr val="accent1"/>
+          </a:fillRef>
+          <a:effectRef idx="0">
+            <a:schemeClr val="accent1"/>
+          </a:effectRef>
+          <a:fontRef idx="minor">
+            <a:schemeClr val="lt1"/>
+          </a:fontRef>
+        </p:style>
+        <p:txBody>
+          <a:bodyPr rtlCol="0" anchor="ctr"/>
+          <a:lstStyle/>
+          <a:p>
+            <a:pPr algn="ctr"/>
+            <a:endParaRPr lang="it-IT" dirty="0"/>
+          </a:p>
+        </p:txBody>
+      </p:sp>
+      <p:sp>
+        <p:nvSpPr>
+          <p:cNvPr id="17" name="Rectangle 16">
+            <a:extLst>
+              <a:ext uri="{FF2B5EF4-FFF2-40B4-BE49-F238E27FC236}">
+                <a16:creationId xmlns:a16="http://schemas.microsoft.com/office/drawing/2014/main" id="{22A65F33-4163-4149-8B60-50DE821EE662}"/>
+              </a:ext>
+            </a:extLst>
+          </p:cNvPr>
+          <p:cNvSpPr/>
+          <p:nvPr/>
+        </p:nvSpPr>
+        <p:spPr>
+          <a:xfrm>
+            <a:off x="2328939" y="3021090"/>
+            <a:ext cx="433672" cy="3056237"/>
+          </a:xfrm>
+          <a:prstGeom prst="rect">
+            <a:avLst/>
+          </a:prstGeom>
+          <a:solidFill>
+            <a:schemeClr val="accent2">
+              <a:alpha val="40000"/>
+            </a:schemeClr>
+          </a:solidFill>
+          <a:ln>
+            <a:noFill/>
+          </a:ln>
+        </p:spPr>
+        <p:style>
+          <a:lnRef idx="2">
+            <a:schemeClr val="accent1">
+              <a:shade val="50000"/>
+            </a:schemeClr>
+          </a:lnRef>
+          <a:fillRef idx="1">
+            <a:schemeClr val="accent1"/>
+          </a:fillRef>
+          <a:effectRef idx="0">
+            <a:schemeClr val="accent1"/>
+          </a:effectRef>
+          <a:fontRef idx="minor">
+            <a:schemeClr val="lt1"/>
+          </a:fontRef>
+        </p:style>
+        <p:txBody>
+          <a:bodyPr rtlCol="0" anchor="ctr"/>
+          <a:lstStyle/>
+          <a:p>
+            <a:pPr algn="ctr"/>
+            <a:endParaRPr lang="it-IT" dirty="0"/>
+          </a:p>
+        </p:txBody>
+      </p:sp>
+      <p:sp>
+        <p:nvSpPr>
+          <p:cNvPr id="18" name="Rectangle 17">
+            <a:extLst>
+              <a:ext uri="{FF2B5EF4-FFF2-40B4-BE49-F238E27FC236}">
+                <a16:creationId xmlns:a16="http://schemas.microsoft.com/office/drawing/2014/main" id="{23A92DBA-318F-4B0D-A529-9DED5C3ED0E8}"/>
+              </a:ext>
+            </a:extLst>
+          </p:cNvPr>
+          <p:cNvSpPr/>
+          <p:nvPr/>
+        </p:nvSpPr>
+        <p:spPr>
+          <a:xfrm>
+            <a:off x="516285" y="3021090"/>
+            <a:ext cx="474316" cy="3056237"/>
+          </a:xfrm>
+          <a:prstGeom prst="rect">
+            <a:avLst/>
+          </a:prstGeom>
+          <a:solidFill>
+            <a:schemeClr val="accent2">
+              <a:alpha val="40000"/>
+            </a:schemeClr>
+          </a:solidFill>
+          <a:ln>
+            <a:noFill/>
+          </a:ln>
+        </p:spPr>
+        <p:style>
+          <a:lnRef idx="2">
+            <a:schemeClr val="accent1">
+              <a:shade val="50000"/>
+            </a:schemeClr>
+          </a:lnRef>
+          <a:fillRef idx="1">
+            <a:schemeClr val="accent1"/>
+          </a:fillRef>
+          <a:effectRef idx="0">
+            <a:schemeClr val="accent1"/>
+          </a:effectRef>
+          <a:fontRef idx="minor">
+            <a:schemeClr val="lt1"/>
+          </a:fontRef>
+        </p:style>
+        <p:txBody>
+          <a:bodyPr rtlCol="0" anchor="ctr"/>
+          <a:lstStyle/>
+          <a:p>
+            <a:pPr algn="ctr"/>
+            <a:endParaRPr lang="it-IT" dirty="0"/>
+          </a:p>
+        </p:txBody>
+      </p:sp>
+      <p:sp>
+        <p:nvSpPr>
+          <p:cNvPr id="19" name="TextBox 18">
+            <a:extLst>
+              <a:ext uri="{FF2B5EF4-FFF2-40B4-BE49-F238E27FC236}">
+                <a16:creationId xmlns:a16="http://schemas.microsoft.com/office/drawing/2014/main" id="{A6CAC4FB-534F-41B5-A900-E9A099C3A708}"/>
+              </a:ext>
+            </a:extLst>
+          </p:cNvPr>
+          <p:cNvSpPr txBox="1"/>
+          <p:nvPr/>
+        </p:nvSpPr>
+        <p:spPr>
+          <a:xfrm>
+            <a:off x="530150" y="2995034"/>
+            <a:ext cx="466851" cy="369332"/>
+          </a:xfrm>
+          <a:prstGeom prst="rect">
+            <a:avLst/>
+          </a:prstGeom>
+          <a:noFill/>
+        </p:spPr>
+        <p:txBody>
+          <a:bodyPr wrap="square" rtlCol="0">
+            <a:spAutoFit/>
+          </a:bodyPr>
+          <a:lstStyle/>
+          <a:p>
+            <a:r>
+              <a:rPr lang="it-IT" dirty="0"/>
+              <a:t>F1</a:t>
+            </a:r>
+          </a:p>
+        </p:txBody>
+      </p:sp>
+      <p:sp>
+        <p:nvSpPr>
+          <p:cNvPr id="20" name="TextBox 19">
+            <a:extLst>
+              <a:ext uri="{FF2B5EF4-FFF2-40B4-BE49-F238E27FC236}">
+                <a16:creationId xmlns:a16="http://schemas.microsoft.com/office/drawing/2014/main" id="{4A7355CC-EA5D-41CB-9D80-1DBFA7731618}"/>
+              </a:ext>
+            </a:extLst>
+          </p:cNvPr>
+          <p:cNvSpPr txBox="1"/>
+          <p:nvPr/>
+        </p:nvSpPr>
+        <p:spPr>
+          <a:xfrm>
+            <a:off x="2334933" y="2979413"/>
+            <a:ext cx="466851" cy="369332"/>
+          </a:xfrm>
+          <a:prstGeom prst="rect">
+            <a:avLst/>
+          </a:prstGeom>
+          <a:noFill/>
+        </p:spPr>
+        <p:txBody>
+          <a:bodyPr wrap="square" rtlCol="0">
+            <a:spAutoFit/>
+          </a:bodyPr>
+          <a:lstStyle/>
+          <a:p>
+            <a:r>
+              <a:rPr lang="it-IT" dirty="0"/>
+              <a:t>F2</a:t>
+            </a:r>
+          </a:p>
+        </p:txBody>
+      </p:sp>
+      <p:sp>
+        <p:nvSpPr>
+          <p:cNvPr id="21" name="TextBox 20">
+            <a:extLst>
+              <a:ext uri="{FF2B5EF4-FFF2-40B4-BE49-F238E27FC236}">
+                <a16:creationId xmlns:a16="http://schemas.microsoft.com/office/drawing/2014/main" id="{2D49FF93-7E91-4541-B054-E347FC33A4F9}"/>
+              </a:ext>
+            </a:extLst>
+          </p:cNvPr>
+          <p:cNvSpPr txBox="1"/>
+          <p:nvPr/>
+        </p:nvSpPr>
+        <p:spPr>
+          <a:xfrm>
+            <a:off x="2776295" y="2995034"/>
+            <a:ext cx="466851" cy="369332"/>
+          </a:xfrm>
+          <a:prstGeom prst="rect">
+            <a:avLst/>
+          </a:prstGeom>
+          <a:noFill/>
+        </p:spPr>
+        <p:txBody>
+          <a:bodyPr wrap="square" rtlCol="0">
+            <a:spAutoFit/>
+          </a:bodyPr>
+          <a:lstStyle/>
+          <a:p>
+            <a:r>
+              <a:rPr lang="it-IT" dirty="0"/>
+              <a:t>F3</a:t>
+            </a:r>
+          </a:p>
+        </p:txBody>
+      </p:sp>
+      <p:sp>
+        <p:nvSpPr>
+          <p:cNvPr id="22" name="TextBox 21">
+            <a:extLst>
+              <a:ext uri="{FF2B5EF4-FFF2-40B4-BE49-F238E27FC236}">
+                <a16:creationId xmlns:a16="http://schemas.microsoft.com/office/drawing/2014/main" id="{16435C6B-4ABE-4A13-8ABB-BEEF943F7C76}"/>
+              </a:ext>
+            </a:extLst>
+          </p:cNvPr>
+          <p:cNvSpPr txBox="1"/>
+          <p:nvPr/>
+        </p:nvSpPr>
+        <p:spPr>
+          <a:xfrm>
+            <a:off x="3248741" y="2995034"/>
+            <a:ext cx="466851" cy="369332"/>
+          </a:xfrm>
+          <a:prstGeom prst="rect">
+            <a:avLst/>
+          </a:prstGeom>
+          <a:noFill/>
+        </p:spPr>
+        <p:txBody>
+          <a:bodyPr wrap="square" rtlCol="0">
+            <a:spAutoFit/>
+          </a:bodyPr>
+          <a:lstStyle/>
+          <a:p>
+            <a:r>
+              <a:rPr lang="it-IT" dirty="0"/>
+              <a:t>F4</a:t>
+            </a:r>
+          </a:p>
+        </p:txBody>
+      </p:sp>
+      <p:sp>
+        <p:nvSpPr>
+          <p:cNvPr id="23" name="TextBox 22">
+            <a:extLst>
+              <a:ext uri="{FF2B5EF4-FFF2-40B4-BE49-F238E27FC236}">
+                <a16:creationId xmlns:a16="http://schemas.microsoft.com/office/drawing/2014/main" id="{635A39EB-6978-4FC2-87BC-0323F4F64D0C}"/>
+              </a:ext>
+            </a:extLst>
+          </p:cNvPr>
+          <p:cNvSpPr txBox="1"/>
+          <p:nvPr/>
+        </p:nvSpPr>
+        <p:spPr>
+          <a:xfrm>
+            <a:off x="3689672" y="2979413"/>
+            <a:ext cx="466851" cy="369332"/>
+          </a:xfrm>
+          <a:prstGeom prst="rect">
+            <a:avLst/>
+          </a:prstGeom>
+          <a:noFill/>
+        </p:spPr>
+        <p:txBody>
+          <a:bodyPr wrap="square" rtlCol="0">
+            <a:spAutoFit/>
+          </a:bodyPr>
+          <a:lstStyle/>
+          <a:p>
+            <a:r>
+              <a:rPr lang="it-IT" dirty="0"/>
+              <a:t>F5</a:t>
+            </a:r>
+          </a:p>
+        </p:txBody>
+      </p:sp>
+      <p:sp>
+        <p:nvSpPr>
+          <p:cNvPr id="24" name="TextBox 23">
+            <a:extLst>
+              <a:ext uri="{FF2B5EF4-FFF2-40B4-BE49-F238E27FC236}">
+                <a16:creationId xmlns:a16="http://schemas.microsoft.com/office/drawing/2014/main" id="{86F218C9-045C-462C-9BCF-45C5FF9FDEB2}"/>
+              </a:ext>
+            </a:extLst>
+          </p:cNvPr>
+          <p:cNvSpPr txBox="1"/>
+          <p:nvPr/>
+        </p:nvSpPr>
+        <p:spPr>
+          <a:xfrm>
+            <a:off x="5057230" y="2995034"/>
+            <a:ext cx="466851" cy="369332"/>
+          </a:xfrm>
+          <a:prstGeom prst="rect">
+            <a:avLst/>
+          </a:prstGeom>
+          <a:noFill/>
+        </p:spPr>
+        <p:txBody>
+          <a:bodyPr wrap="square" rtlCol="0">
+            <a:spAutoFit/>
+          </a:bodyPr>
+          <a:lstStyle/>
+          <a:p>
+            <a:r>
+              <a:rPr lang="it-IT" dirty="0"/>
+              <a:t>F6</a:t>
+            </a:r>
+          </a:p>
+        </p:txBody>
+      </p:sp>
+      <p:sp>
+        <p:nvSpPr>
+          <p:cNvPr id="25" name="TextBox 24">
+            <a:extLst>
+              <a:ext uri="{FF2B5EF4-FFF2-40B4-BE49-F238E27FC236}">
+                <a16:creationId xmlns:a16="http://schemas.microsoft.com/office/drawing/2014/main" id="{89B10686-874C-4850-BDA8-8E9E6D2BDFF1}"/>
+              </a:ext>
+            </a:extLst>
+          </p:cNvPr>
+          <p:cNvSpPr txBox="1"/>
+          <p:nvPr/>
+        </p:nvSpPr>
+        <p:spPr>
+          <a:xfrm>
+            <a:off x="5509339" y="2995034"/>
+            <a:ext cx="466851" cy="369332"/>
+          </a:xfrm>
+          <a:prstGeom prst="rect">
+            <a:avLst/>
+          </a:prstGeom>
+          <a:noFill/>
+        </p:spPr>
+        <p:txBody>
+          <a:bodyPr wrap="square" rtlCol="0">
+            <a:spAutoFit/>
+          </a:bodyPr>
+          <a:lstStyle/>
+          <a:p>
+            <a:r>
+              <a:rPr lang="it-IT" dirty="0"/>
+              <a:t>F7</a:t>
+            </a:r>
+          </a:p>
+        </p:txBody>
+      </p:sp>
+      <p:sp>
+        <p:nvSpPr>
+          <p:cNvPr id="26" name="Left Brace 25">
+            <a:extLst>
+              <a:ext uri="{FF2B5EF4-FFF2-40B4-BE49-F238E27FC236}">
+                <a16:creationId xmlns:a16="http://schemas.microsoft.com/office/drawing/2014/main" id="{F1B5CED9-A0CB-4CD2-8773-0693F88AA755}"/>
+              </a:ext>
+            </a:extLst>
+          </p:cNvPr>
+          <p:cNvSpPr/>
+          <p:nvPr/>
+        </p:nvSpPr>
+        <p:spPr>
+          <a:xfrm rot="5400000">
+            <a:off x="3005787" y="-119087"/>
+            <a:ext cx="466851" cy="5418120"/>
+          </a:xfrm>
+          <a:prstGeom prst="leftBrace">
+            <a:avLst/>
+          </a:prstGeom>
+          <a:noFill/>
+          <a:ln>
+            <a:solidFill>
+              <a:schemeClr val="accent2"/>
+            </a:solidFill>
+          </a:ln>
+        </p:spPr>
+        <p:style>
+          <a:lnRef idx="1">
+            <a:schemeClr val="accent1"/>
+          </a:lnRef>
+          <a:fillRef idx="0">
+            <a:schemeClr val="accent1"/>
+          </a:fillRef>
+          <a:effectRef idx="0">
+            <a:schemeClr val="accent1"/>
+          </a:effectRef>
+          <a:fontRef idx="minor">
+            <a:schemeClr val="tx1"/>
+          </a:fontRef>
+        </p:style>
+        <p:txBody>
+          <a:bodyPr rtlCol="0" anchor="ctr"/>
+          <a:lstStyle/>
+          <a:p>
+            <a:pPr algn="ctr"/>
+            <a:endParaRPr lang="it-IT"/>
+          </a:p>
+        </p:txBody>
+      </p:sp>
+      <p:sp>
+        <p:nvSpPr>
+          <p:cNvPr id="27" name="TextBox 26">
+            <a:extLst>
+              <a:ext uri="{FF2B5EF4-FFF2-40B4-BE49-F238E27FC236}">
+                <a16:creationId xmlns:a16="http://schemas.microsoft.com/office/drawing/2014/main" id="{F61ABD6A-9EC7-4CB4-BE07-810CD11FADC3}"/>
+              </a:ext>
+            </a:extLst>
+          </p:cNvPr>
+          <p:cNvSpPr txBox="1"/>
+          <p:nvPr/>
+        </p:nvSpPr>
+        <p:spPr>
+          <a:xfrm>
+            <a:off x="2667311" y="1959515"/>
+            <a:ext cx="3308879" cy="369332"/>
+          </a:xfrm>
+          <a:prstGeom prst="rect">
+            <a:avLst/>
+          </a:prstGeom>
+          <a:noFill/>
+        </p:spPr>
+        <p:txBody>
+          <a:bodyPr wrap="square" rtlCol="0">
+            <a:spAutoFit/>
+          </a:bodyPr>
+          <a:lstStyle/>
+          <a:p>
+            <a:r>
+              <a:rPr lang="it-IT" dirty="0"/>
+              <a:t>PREDICTORS</a:t>
+            </a:r>
+          </a:p>
+        </p:txBody>
+      </p:sp>
+      <p:cxnSp>
+        <p:nvCxnSpPr>
+          <p:cNvPr id="29" name="Straight Arrow Connector 28">
+            <a:extLst>
+              <a:ext uri="{FF2B5EF4-FFF2-40B4-BE49-F238E27FC236}">
+                <a16:creationId xmlns:a16="http://schemas.microsoft.com/office/drawing/2014/main" id="{E1FB3C46-114E-4283-8EA8-6CAC1253BF31}"/>
+              </a:ext>
+            </a:extLst>
+          </p:cNvPr>
+          <p:cNvCxnSpPr/>
+          <p:nvPr/>
+        </p:nvCxnSpPr>
+        <p:spPr>
+          <a:xfrm flipV="1">
+            <a:off x="6705600" y="2823399"/>
+            <a:ext cx="563880" cy="697041"/>
+          </a:xfrm>
+          <a:prstGeom prst="straightConnector1">
+            <a:avLst/>
+          </a:prstGeom>
+          <a:ln>
+            <a:solidFill>
+              <a:schemeClr val="tx1"/>
+            </a:solidFill>
+            <a:tailEnd type="triangle"/>
+          </a:ln>
+        </p:spPr>
+        <p:style>
+          <a:lnRef idx="1">
+            <a:schemeClr val="accent1"/>
+          </a:lnRef>
+          <a:fillRef idx="0">
+            <a:schemeClr val="accent1"/>
+          </a:fillRef>
+          <a:effectRef idx="0">
+            <a:schemeClr val="accent1"/>
+          </a:effectRef>
+          <a:fontRef idx="minor">
+            <a:schemeClr val="tx1"/>
+          </a:fontRef>
+        </p:style>
+      </p:cxnSp>
+    </p:spTree>
+    <p:extLst>
+      <p:ext uri="{BB962C8B-B14F-4D97-AF65-F5344CB8AC3E}">
+        <p14:creationId xmlns:p14="http://schemas.microsoft.com/office/powerpoint/2010/main" val="3925132733"/>
       </p:ext>
     </p:extLst>
   </p:cSld>

</xml_diff>

<commit_message>
glms on lateral buds
</commit_message>
<xml_diff>
--- a/Procedures_coding_hazelnut_architecture.pptx
+++ b/Procedures_coding_hazelnut_architecture.pptx
@@ -14,6 +14,8 @@
     <p:sldId id="266" r:id="rId8"/>
     <p:sldId id="265" r:id="rId9"/>
     <p:sldId id="267" r:id="rId10"/>
+    <p:sldId id="268" r:id="rId11"/>
+    <p:sldId id="269" r:id="rId12"/>
   </p:sldIdLst>
   <p:sldSz cx="9144000" cy="6858000" type="screen4x3"/>
   <p:notesSz cx="9144000" cy="6858000"/>
@@ -251,7 +253,7 @@
           <a:p>
             <a:fld id="{B4170786-3030-4160-9468-62B9527C914D}" type="datetimeFigureOut">
               <a:rPr lang="it-IT" smtClean="0"/>
-              <a:t>28/01/2022</a:t>
+              <a:t>02/02/2022</a:t>
             </a:fld>
             <a:endParaRPr lang="it-IT"/>
           </a:p>
@@ -421,7 +423,7 @@
           <a:p>
             <a:fld id="{B4170786-3030-4160-9468-62B9527C914D}" type="datetimeFigureOut">
               <a:rPr lang="it-IT" smtClean="0"/>
-              <a:t>28/01/2022</a:t>
+              <a:t>02/02/2022</a:t>
             </a:fld>
             <a:endParaRPr lang="it-IT"/>
           </a:p>
@@ -601,7 +603,7 @@
           <a:p>
             <a:fld id="{B4170786-3030-4160-9468-62B9527C914D}" type="datetimeFigureOut">
               <a:rPr lang="it-IT" smtClean="0"/>
-              <a:t>28/01/2022</a:t>
+              <a:t>02/02/2022</a:t>
             </a:fld>
             <a:endParaRPr lang="it-IT"/>
           </a:p>
@@ -771,7 +773,7 @@
           <a:p>
             <a:fld id="{B4170786-3030-4160-9468-62B9527C914D}" type="datetimeFigureOut">
               <a:rPr lang="it-IT" smtClean="0"/>
-              <a:t>28/01/2022</a:t>
+              <a:t>02/02/2022</a:t>
             </a:fld>
             <a:endParaRPr lang="it-IT"/>
           </a:p>
@@ -1015,7 +1017,7 @@
           <a:p>
             <a:fld id="{B4170786-3030-4160-9468-62B9527C914D}" type="datetimeFigureOut">
               <a:rPr lang="it-IT" smtClean="0"/>
-              <a:t>28/01/2022</a:t>
+              <a:t>02/02/2022</a:t>
             </a:fld>
             <a:endParaRPr lang="it-IT"/>
           </a:p>
@@ -1247,7 +1249,7 @@
           <a:p>
             <a:fld id="{B4170786-3030-4160-9468-62B9527C914D}" type="datetimeFigureOut">
               <a:rPr lang="it-IT" smtClean="0"/>
-              <a:t>28/01/2022</a:t>
+              <a:t>02/02/2022</a:t>
             </a:fld>
             <a:endParaRPr lang="it-IT"/>
           </a:p>
@@ -1614,7 +1616,7 @@
           <a:p>
             <a:fld id="{B4170786-3030-4160-9468-62B9527C914D}" type="datetimeFigureOut">
               <a:rPr lang="it-IT" smtClean="0"/>
-              <a:t>28/01/2022</a:t>
+              <a:t>02/02/2022</a:t>
             </a:fld>
             <a:endParaRPr lang="it-IT"/>
           </a:p>
@@ -1732,7 +1734,7 @@
           <a:p>
             <a:fld id="{B4170786-3030-4160-9468-62B9527C914D}" type="datetimeFigureOut">
               <a:rPr lang="it-IT" smtClean="0"/>
-              <a:t>28/01/2022</a:t>
+              <a:t>02/02/2022</a:t>
             </a:fld>
             <a:endParaRPr lang="it-IT"/>
           </a:p>
@@ -1827,7 +1829,7 @@
           <a:p>
             <a:fld id="{B4170786-3030-4160-9468-62B9527C914D}" type="datetimeFigureOut">
               <a:rPr lang="it-IT" smtClean="0"/>
-              <a:t>28/01/2022</a:t>
+              <a:t>02/02/2022</a:t>
             </a:fld>
             <a:endParaRPr lang="it-IT"/>
           </a:p>
@@ -2104,7 +2106,7 @@
           <a:p>
             <a:fld id="{B4170786-3030-4160-9468-62B9527C914D}" type="datetimeFigureOut">
               <a:rPr lang="it-IT" smtClean="0"/>
-              <a:t>28/01/2022</a:t>
+              <a:t>02/02/2022</a:t>
             </a:fld>
             <a:endParaRPr lang="it-IT"/>
           </a:p>
@@ -2361,7 +2363,7 @@
           <a:p>
             <a:fld id="{B4170786-3030-4160-9468-62B9527C914D}" type="datetimeFigureOut">
               <a:rPr lang="it-IT" smtClean="0"/>
-              <a:t>28/01/2022</a:t>
+              <a:t>02/02/2022</a:t>
             </a:fld>
             <a:endParaRPr lang="it-IT"/>
           </a:p>
@@ -2574,7 +2576,7 @@
           <a:p>
             <a:fld id="{B4170786-3030-4160-9468-62B9527C914D}" type="datetimeFigureOut">
               <a:rPr lang="it-IT" smtClean="0"/>
-              <a:t>28/01/2022</a:t>
+              <a:t>02/02/2022</a:t>
             </a:fld>
             <a:endParaRPr lang="it-IT"/>
           </a:p>
@@ -4283,6 +4285,224 @@
 </p:sld>
 </file>
 
+<file path=ppt/slides/slide10.xml><?xml version="1.0" encoding="utf-8"?>
+<p:sld xmlns:a="http://schemas.openxmlformats.org/drawingml/2006/main" xmlns:r="http://schemas.openxmlformats.org/officeDocument/2006/relationships" xmlns:p="http://schemas.openxmlformats.org/presentationml/2006/main">
+  <p:cSld>
+    <p:spTree>
+      <p:nvGrpSpPr>
+        <p:cNvPr id="1" name=""/>
+        <p:cNvGrpSpPr/>
+        <p:nvPr/>
+      </p:nvGrpSpPr>
+      <p:grpSpPr>
+        <a:xfrm>
+          <a:off x="0" y="0"/>
+          <a:ext cx="0" cy="0"/>
+          <a:chOff x="0" y="0"/>
+          <a:chExt cx="0" cy="0"/>
+        </a:xfrm>
+      </p:grpSpPr>
+      <p:sp>
+        <p:nvSpPr>
+          <p:cNvPr id="5" name="Rectangle 4">
+            <a:extLst>
+              <a:ext uri="{FF2B5EF4-FFF2-40B4-BE49-F238E27FC236}">
+                <a16:creationId xmlns:a16="http://schemas.microsoft.com/office/drawing/2014/main" id="{D43F202D-DE28-4A70-845D-213DCDAE3981}"/>
+              </a:ext>
+            </a:extLst>
+          </p:cNvPr>
+          <p:cNvSpPr/>
+          <p:nvPr/>
+        </p:nvSpPr>
+        <p:spPr>
+          <a:xfrm>
+            <a:off x="-46569" y="0"/>
+            <a:ext cx="2071465" cy="707886"/>
+          </a:xfrm>
+          <a:prstGeom prst="rect">
+            <a:avLst/>
+          </a:prstGeom>
+          <a:noFill/>
+        </p:spPr>
+        <p:txBody>
+          <a:bodyPr wrap="none" lIns="91440" tIns="45720" rIns="91440" bIns="45720">
+            <a:spAutoFit/>
+          </a:bodyPr>
+          <a:lstStyle/>
+          <a:p>
+            <a:pPr algn="ctr"/>
+            <a:r>
+              <a:rPr lang="en-US" sz="4000" b="0" cap="none" spc="0" dirty="0">
+                <a:ln w="0"/>
+                <a:solidFill>
+                  <a:schemeClr val="accent6">
+                    <a:lumMod val="50000"/>
+                  </a:schemeClr>
+                </a:solidFill>
+                <a:effectLst>
+                  <a:outerShdw blurRad="38100" dist="19050" dir="2700000" algn="tl" rotWithShape="0">
+                    <a:schemeClr val="dk1">
+                      <a:alpha val="40000"/>
+                    </a:schemeClr>
+                  </a:outerShdw>
+                </a:effectLst>
+              </a:rPr>
+              <a:t>Fate=“V”</a:t>
+            </a:r>
+          </a:p>
+        </p:txBody>
+      </p:sp>
+      <p:pic>
+        <p:nvPicPr>
+          <p:cNvPr id="7" name="Picture 6">
+            <a:extLst>
+              <a:ext uri="{FF2B5EF4-FFF2-40B4-BE49-F238E27FC236}">
+                <a16:creationId xmlns:a16="http://schemas.microsoft.com/office/drawing/2014/main" id="{A2C5796A-ACBC-4C4D-83A6-58E5BEC17A3B}"/>
+              </a:ext>
+            </a:extLst>
+          </p:cNvPr>
+          <p:cNvPicPr>
+            <a:picLocks noChangeAspect="1"/>
+          </p:cNvPicPr>
+          <p:nvPr/>
+        </p:nvPicPr>
+        <p:blipFill>
+          <a:blip r:embed="rId2"/>
+          <a:stretch>
+            <a:fillRect/>
+          </a:stretch>
+        </p:blipFill>
+        <p:spPr>
+          <a:xfrm>
+            <a:off x="0" y="785854"/>
+            <a:ext cx="9144000" cy="6081022"/>
+          </a:xfrm>
+          <a:prstGeom prst="rect">
+            <a:avLst/>
+          </a:prstGeom>
+        </p:spPr>
+      </p:pic>
+    </p:spTree>
+    <p:extLst>
+      <p:ext uri="{BB962C8B-B14F-4D97-AF65-F5344CB8AC3E}">
+        <p14:creationId xmlns:p14="http://schemas.microsoft.com/office/powerpoint/2010/main" val="41705430"/>
+      </p:ext>
+    </p:extLst>
+  </p:cSld>
+  <p:clrMapOvr>
+    <a:masterClrMapping/>
+  </p:clrMapOvr>
+</p:sld>
+</file>
+
+<file path=ppt/slides/slide11.xml><?xml version="1.0" encoding="utf-8"?>
+<p:sld xmlns:a="http://schemas.openxmlformats.org/drawingml/2006/main" xmlns:r="http://schemas.openxmlformats.org/officeDocument/2006/relationships" xmlns:p="http://schemas.openxmlformats.org/presentationml/2006/main">
+  <p:cSld>
+    <p:spTree>
+      <p:nvGrpSpPr>
+        <p:cNvPr id="1" name=""/>
+        <p:cNvGrpSpPr/>
+        <p:nvPr/>
+      </p:nvGrpSpPr>
+      <p:grpSpPr>
+        <a:xfrm>
+          <a:off x="0" y="0"/>
+          <a:ext cx="0" cy="0"/>
+          <a:chOff x="0" y="0"/>
+          <a:chExt cx="0" cy="0"/>
+        </a:xfrm>
+      </p:grpSpPr>
+      <p:sp>
+        <p:nvSpPr>
+          <p:cNvPr id="5" name="Rectangle 4">
+            <a:extLst>
+              <a:ext uri="{FF2B5EF4-FFF2-40B4-BE49-F238E27FC236}">
+                <a16:creationId xmlns:a16="http://schemas.microsoft.com/office/drawing/2014/main" id="{D43F202D-DE28-4A70-845D-213DCDAE3981}"/>
+              </a:ext>
+            </a:extLst>
+          </p:cNvPr>
+          <p:cNvSpPr/>
+          <p:nvPr/>
+        </p:nvSpPr>
+        <p:spPr>
+          <a:xfrm>
+            <a:off x="0" y="0"/>
+            <a:ext cx="2191626" cy="707886"/>
+          </a:xfrm>
+          <a:prstGeom prst="rect">
+            <a:avLst/>
+          </a:prstGeom>
+          <a:noFill/>
+        </p:spPr>
+        <p:txBody>
+          <a:bodyPr wrap="none" lIns="91440" tIns="45720" rIns="91440" bIns="45720">
+            <a:spAutoFit/>
+          </a:bodyPr>
+          <a:lstStyle/>
+          <a:p>
+            <a:pPr algn="ctr"/>
+            <a:r>
+              <a:rPr lang="en-US" sz="4000" b="0" cap="none" spc="0" dirty="0">
+                <a:ln w="0"/>
+                <a:solidFill>
+                  <a:srgbClr val="FF66FF"/>
+                </a:solidFill>
+                <a:effectLst>
+                  <a:outerShdw blurRad="38100" dist="19050" dir="2700000" algn="tl" rotWithShape="0">
+                    <a:schemeClr val="dk1">
+                      <a:alpha val="40000"/>
+                    </a:schemeClr>
+                  </a:outerShdw>
+                </a:effectLst>
+              </a:rPr>
+              <a:t>Fate=“M”</a:t>
+            </a:r>
+          </a:p>
+        </p:txBody>
+      </p:sp>
+      <p:pic>
+        <p:nvPicPr>
+          <p:cNvPr id="3" name="Picture 2">
+            <a:extLst>
+              <a:ext uri="{FF2B5EF4-FFF2-40B4-BE49-F238E27FC236}">
+                <a16:creationId xmlns:a16="http://schemas.microsoft.com/office/drawing/2014/main" id="{5940B255-2C7A-4689-BE67-8A88EC4D141C}"/>
+              </a:ext>
+            </a:extLst>
+          </p:cNvPr>
+          <p:cNvPicPr>
+            <a:picLocks noChangeAspect="1"/>
+          </p:cNvPicPr>
+          <p:nvPr/>
+        </p:nvPicPr>
+        <p:blipFill>
+          <a:blip r:embed="rId2"/>
+          <a:stretch>
+            <a:fillRect/>
+          </a:stretch>
+        </p:blipFill>
+        <p:spPr>
+          <a:xfrm>
+            <a:off x="0" y="829235"/>
+            <a:ext cx="9144000" cy="6028765"/>
+          </a:xfrm>
+          <a:prstGeom prst="rect">
+            <a:avLst/>
+          </a:prstGeom>
+        </p:spPr>
+      </p:pic>
+    </p:spTree>
+    <p:extLst>
+      <p:ext uri="{BB962C8B-B14F-4D97-AF65-F5344CB8AC3E}">
+        <p14:creationId xmlns:p14="http://schemas.microsoft.com/office/powerpoint/2010/main" val="1205869841"/>
+      </p:ext>
+    </p:extLst>
+  </p:cSld>
+  <p:clrMapOvr>
+    <a:masterClrMapping/>
+  </p:clrMapOvr>
+</p:sld>
+</file>
+
 <file path=ppt/slides/slide2.xml><?xml version="1.0" encoding="utf-8"?>
 <p:sld xmlns:a="http://schemas.openxmlformats.org/drawingml/2006/main" xmlns:r="http://schemas.openxmlformats.org/officeDocument/2006/relationships" xmlns:p="http://schemas.openxmlformats.org/presentationml/2006/main">
   <p:cSld>
@@ -4359,7 +4579,7 @@
         </p:nvSpPr>
         <p:spPr>
           <a:xfrm>
-            <a:off x="0" y="563173"/>
+            <a:off x="-8313" y="563173"/>
             <a:ext cx="1848359" cy="398187"/>
           </a:xfrm>
           <a:prstGeom prst="rect">
@@ -4408,8 +4628,8 @@
         </p:nvSpPr>
         <p:spPr>
           <a:xfrm>
-            <a:off x="3989800" y="520039"/>
-            <a:ext cx="1095941" cy="276999"/>
+            <a:off x="3759767" y="563173"/>
+            <a:ext cx="1556003" cy="276999"/>
           </a:xfrm>
           <a:prstGeom prst="rect">
             <a:avLst/>
@@ -4424,7 +4644,7 @@
           <a:p>
             <a:r>
               <a:rPr lang="it-IT" sz="1200" dirty="0"/>
-              <a:t>OWN-ROOTED</a:t>
+              <a:t>OWN-ROOTED e INNE</a:t>
             </a:r>
           </a:p>
         </p:txBody>
@@ -4444,7 +4664,7 @@
           <p:nvPr>
             <p:extLst>
               <p:ext uri="{D42A27DB-BD31-4B8C-83A1-F6EECF244321}">
-                <p14:modId xmlns:p14="http://schemas.microsoft.com/office/powerpoint/2010/main" val="2332931689"/>
+                <p14:modId xmlns:p14="http://schemas.microsoft.com/office/powerpoint/2010/main" val="2837429025"/>
               </p:ext>
             </p:extLst>
           </p:nvPr>
@@ -4629,7 +4849,11 @@
                     <a:lstStyle/>
                     <a:p>
                       <a:r>
-                        <a:rPr lang="it-IT" sz="1200" dirty="0"/>
+                        <a:rPr lang="it-IT" sz="1200" dirty="0">
+                          <a:highlight>
+                            <a:srgbClr val="FFFF00"/>
+                          </a:highlight>
+                        </a:rPr>
                         <a:t>2020DFAUTO.csv</a:t>
                       </a:r>
                     </a:p>
@@ -9982,8 +10206,8 @@
         </p:nvSpPr>
         <p:spPr>
           <a:xfrm>
-            <a:off x="3127253" y="846113"/>
-            <a:ext cx="4547062" cy="369332"/>
+            <a:off x="2262476" y="811453"/>
+            <a:ext cx="5007004" cy="369332"/>
           </a:xfrm>
           <a:prstGeom prst="rect">
             <a:avLst/>
@@ -9997,9 +10221,10 @@
           <a:lstStyle/>
           <a:p>
             <a:r>
-              <a:rPr lang="it-IT" dirty="0"/>
-              <a:t>glm(Y~F1+F2+F3+F4+F5+F6+F7)</a:t>
-            </a:r>
+              <a:rPr lang="it-IT"/>
+              <a:t>glm(Y~F1+F2+F3+F4+F5+F6+F7, family=«binomial»)</a:t>
+            </a:r>
+            <a:endParaRPr lang="it-IT" dirty="0"/>
           </a:p>
         </p:txBody>
       </p:sp>
@@ -10842,6 +11067,62 @@
           </a:fontRef>
         </p:style>
       </p:cxnSp>
+      <p:sp>
+        <p:nvSpPr>
+          <p:cNvPr id="28" name="TextBox 27">
+            <a:extLst>
+              <a:ext uri="{FF2B5EF4-FFF2-40B4-BE49-F238E27FC236}">
+                <a16:creationId xmlns:a16="http://schemas.microsoft.com/office/drawing/2014/main" id="{E8759D5A-C379-41C3-B61A-94E4CDB0AFB3}"/>
+              </a:ext>
+            </a:extLst>
+          </p:cNvPr>
+          <p:cNvSpPr txBox="1"/>
+          <p:nvPr/>
+        </p:nvSpPr>
+        <p:spPr>
+          <a:xfrm>
+            <a:off x="47330" y="6611779"/>
+            <a:ext cx="4718648" cy="246221"/>
+          </a:xfrm>
+          <a:prstGeom prst="rect">
+            <a:avLst/>
+          </a:prstGeom>
+          <a:noFill/>
+        </p:spPr>
+        <p:txBody>
+          <a:bodyPr wrap="square">
+            <a:spAutoFit/>
+          </a:bodyPr>
+          <a:lstStyle/>
+          <a:p>
+            <a:r>
+              <a:rPr lang="en-US" sz="1000" dirty="0">
+                <a:hlinkClick r:id="rId3"/>
+              </a:rPr>
+              <a:t>How to Interpret </a:t>
+            </a:r>
+            <a:r>
+              <a:rPr lang="en-US" sz="1000" dirty="0" err="1">
+                <a:hlinkClick r:id="rId3"/>
+              </a:rPr>
+              <a:t>glm</a:t>
+            </a:r>
+            <a:r>
+              <a:rPr lang="en-US" sz="1000" dirty="0">
+                <a:hlinkClick r:id="rId3"/>
+              </a:rPr>
+              <a:t> Output in R (With Example) - </a:t>
+            </a:r>
+            <a:r>
+              <a:rPr lang="en-US" sz="1000" dirty="0" err="1">
+                <a:hlinkClick r:id="rId3"/>
+              </a:rPr>
+              <a:t>Statology</a:t>
+            </a:r>
+            <a:endParaRPr lang="it-IT" sz="1000" dirty="0"/>
+          </a:p>
+        </p:txBody>
+      </p:sp>
     </p:spTree>
     <p:extLst>
       <p:ext uri="{BB962C8B-B14F-4D97-AF65-F5344CB8AC3E}">

</xml_diff>